<commit_message>
added modified cocept sheet except for introduce our team
</commit_message>
<xml_diff>
--- a/models/モデルシートHOMMAv3.pptx
+++ b/models/モデルシートHOMMAv3.pptx
@@ -27668,11 +27668,11 @@
           <c:showPercent val="0"/>
           <c:showBubbleSize val="0"/>
         </c:dLbls>
-        <c:axId val="39178624"/>
-        <c:axId val="39180160"/>
+        <c:axId val="95760384"/>
+        <c:axId val="95761920"/>
       </c:scatterChart>
       <c:valAx>
-        <c:axId val="39178624"/>
+        <c:axId val="95760384"/>
         <c:scaling>
           <c:orientation val="minMax"/>
         </c:scaling>
@@ -27682,12 +27682,12 @@
         <c:majorTickMark val="out"/>
         <c:minorTickMark val="none"/>
         <c:tickLblPos val="nextTo"/>
-        <c:crossAx val="39180160"/>
+        <c:crossAx val="95761920"/>
         <c:crosses val="autoZero"/>
         <c:crossBetween val="midCat"/>
       </c:valAx>
       <c:valAx>
-        <c:axId val="39180160"/>
+        <c:axId val="95761920"/>
         <c:scaling>
           <c:orientation val="minMax"/>
         </c:scaling>
@@ -27697,7 +27697,7 @@
         <c:majorTickMark val="out"/>
         <c:minorTickMark val="none"/>
         <c:tickLblPos val="nextTo"/>
-        <c:crossAx val="39178624"/>
+        <c:crossAx val="95760384"/>
         <c:crosses val="autoZero"/>
         <c:crossBetween val="midCat"/>
       </c:valAx>
@@ -27920,11 +27920,11 @@
         </c:dLbls>
         <c:marker val="1"/>
         <c:smooth val="0"/>
-        <c:axId val="114279552"/>
-        <c:axId val="114281088"/>
+        <c:axId val="105149184"/>
+        <c:axId val="105150720"/>
       </c:lineChart>
       <c:catAx>
-        <c:axId val="114279552"/>
+        <c:axId val="105149184"/>
         <c:scaling>
           <c:orientation val="minMax"/>
         </c:scaling>
@@ -27933,7 +27933,7 @@
         <c:majorTickMark val="out"/>
         <c:minorTickMark val="none"/>
         <c:tickLblPos val="nextTo"/>
-        <c:crossAx val="114281088"/>
+        <c:crossAx val="105150720"/>
         <c:crosses val="autoZero"/>
         <c:auto val="1"/>
         <c:lblAlgn val="ctr"/>
@@ -27941,7 +27941,7 @@
         <c:noMultiLvlLbl val="0"/>
       </c:catAx>
       <c:valAx>
-        <c:axId val="114281088"/>
+        <c:axId val="105150720"/>
         <c:scaling>
           <c:orientation val="minMax"/>
         </c:scaling>
@@ -27952,7 +27952,7 @@
         <c:majorTickMark val="out"/>
         <c:minorTickMark val="none"/>
         <c:tickLblPos val="nextTo"/>
-        <c:crossAx val="114279552"/>
+        <c:crossAx val="105149184"/>
         <c:crosses val="autoZero"/>
         <c:crossBetween val="between"/>
       </c:valAx>
@@ -33652,7 +33652,7 @@
         </p:nvSpPr>
         <p:spPr bwMode="auto">
           <a:xfrm>
-            <a:off x="7364486" y="1533798"/>
+            <a:off x="7368183" y="1533798"/>
             <a:ext cx="5548313" cy="7659290"/>
           </a:xfrm>
           <a:prstGeom prst="rect">
@@ -33695,9 +33695,20 @@
               </a:spcBef>
             </a:pPr>
             <a:r>
-              <a:rPr lang="ja-JP" altLang="en-US" sz="1600" b="1" dirty="0"/>
-              <a:t>☆モデルの概要</a:t>
-            </a:r>
+              <a:rPr lang="ja-JP" altLang="en-US" sz="1400" b="1" dirty="0">
+                <a:latin typeface="+mn-ea"/>
+              </a:rPr>
+              <a:t>☆モデルの</a:t>
+            </a:r>
+            <a:r>
+              <a:rPr lang="ja-JP" altLang="en-US" sz="1400" b="1" dirty="0" smtClean="0">
+                <a:latin typeface="+mn-ea"/>
+              </a:rPr>
+              <a:t>概要</a:t>
+            </a:r>
+            <a:endParaRPr lang="en-US" altLang="ja-JP" sz="1400" b="1" dirty="0" smtClean="0">
+              <a:latin typeface="+mn-ea"/>
+            </a:endParaRPr>
           </a:p>
           <a:p>
             <a:pPr marL="481013" indent="-481013" defTabSz="1279525">
@@ -33709,46 +33720,284 @@
               </a:spcBef>
             </a:pPr>
             <a:r>
-              <a:rPr lang="ja-JP" altLang="en-US" sz="1400" dirty="0"/>
-              <a:t>　　</a:t>
-            </a:r>
-            <a:r>
-              <a:rPr lang="ja-JP" altLang="en-US" sz="1400" dirty="0" smtClean="0"/>
+              <a:rPr lang="ja-JP" altLang="en-US" sz="1200" dirty="0" smtClean="0">
+                <a:latin typeface="+mn-ea"/>
+              </a:rPr>
+              <a:t>  </a:t>
+            </a:r>
+            <a:r>
+              <a:rPr lang="en-US" altLang="ja-JP" sz="1200" dirty="0" smtClean="0">
+                <a:latin typeface="+mn-ea"/>
+              </a:rPr>
+              <a:t>	</a:t>
+            </a:r>
+            <a:r>
+              <a:rPr lang="ja-JP" altLang="en-US" sz="1200" dirty="0" smtClean="0">
+                <a:latin typeface="+mn-ea"/>
+              </a:rPr>
               <a:t>　</a:t>
             </a:r>
             <a:r>
-              <a:rPr lang="ja-JP" altLang="en-US" sz="1200" dirty="0" smtClean="0"/>
-              <a:t>大会における目標に対して要求図を用いて要素を抽出しました。要素の一つとして上がった区間について詳細なドメイン分析を行うことで、下図のパッケージ構成が導き出されました。詳細は</a:t>
-            </a:r>
-            <a:r>
-              <a:rPr lang="en-US" altLang="ja-JP" sz="1200" dirty="0" smtClean="0"/>
-              <a:t>P2</a:t>
-            </a:r>
-            <a:r>
-              <a:rPr lang="ja-JP" altLang="en-US" sz="1200" dirty="0" smtClean="0"/>
-              <a:t>構造を参照。要求とパッケージ構成にもとづいてクラスを抽出しました。システムの機能である区間の切り替えと駆動という</a:t>
-            </a:r>
-            <a:r>
-              <a:rPr lang="en-US" altLang="ja-JP" sz="1200" dirty="0" smtClean="0"/>
-              <a:t>2</a:t>
-            </a:r>
-            <a:r>
-              <a:rPr lang="ja-JP" altLang="en-US" sz="1200" dirty="0" err="1" smtClean="0"/>
-              <a:t>つの</a:t>
-            </a:r>
-            <a:r>
-              <a:rPr lang="ja-JP" altLang="en-US" sz="1200" dirty="0" smtClean="0"/>
-              <a:t>振る舞いについて並行性設計を踏まえながら分析を行うことで実現可能性を検証しました。詳細はｐ３振る舞い参照。走行戦略においては難所の各区間において、どのような振る舞いをするのかを示し、そこで使われている主な要素技術について、</a:t>
-            </a:r>
-            <a:r>
-              <a:rPr lang="en-US" altLang="ja-JP" sz="1200" dirty="0" smtClean="0"/>
+              <a:rPr lang="en-US" altLang="ja-JP" sz="1200" dirty="0" smtClean="0">
+                <a:latin typeface="+mn-ea"/>
+              </a:rPr>
+              <a:t>UML</a:t>
+            </a:r>
+            <a:r>
+              <a:rPr lang="ja-JP" altLang="en-US" sz="1200" dirty="0" smtClean="0">
+                <a:latin typeface="+mn-ea"/>
+              </a:rPr>
+              <a:t>と</a:t>
+            </a:r>
+            <a:r>
+              <a:rPr lang="en-US" altLang="ja-JP" sz="1200" dirty="0" err="1" smtClean="0">
+                <a:latin typeface="+mn-ea"/>
+              </a:rPr>
+              <a:t>SysML</a:t>
+            </a:r>
+            <a:r>
+              <a:rPr lang="ja-JP" altLang="en-US" sz="1200" dirty="0" smtClean="0">
+                <a:latin typeface="+mn-ea"/>
+              </a:rPr>
+              <a:t>を用いてモデルを構成しました</a:t>
+            </a:r>
+            <a:r>
+              <a:rPr lang="en-US" altLang="ja-JP" sz="1200" dirty="0" smtClean="0">
+                <a:latin typeface="+mn-ea"/>
+              </a:rPr>
+              <a:t>.</a:t>
+            </a:r>
+            <a:r>
+              <a:rPr lang="ja-JP" altLang="en-US" sz="1200" dirty="0" smtClean="0">
+                <a:latin typeface="+mn-ea"/>
+              </a:rPr>
+              <a:t>大会</a:t>
+            </a:r>
+            <a:r>
+              <a:rPr lang="ja-JP" altLang="en-US" sz="1200" dirty="0" smtClean="0">
+                <a:latin typeface="+mn-ea"/>
+              </a:rPr>
+              <a:t>における目標に対して要求図を用いて要素を抽出しました。要素の</a:t>
+            </a:r>
+            <a:r>
+              <a:rPr lang="ja-JP" altLang="en-US" sz="1200" dirty="0" smtClean="0">
+                <a:latin typeface="+mn-ea"/>
+              </a:rPr>
+              <a:t>一つである区間</a:t>
+            </a:r>
+            <a:r>
+              <a:rPr lang="ja-JP" altLang="en-US" sz="1200" dirty="0" smtClean="0">
+                <a:latin typeface="+mn-ea"/>
+              </a:rPr>
+              <a:t>について詳細</a:t>
+            </a:r>
+            <a:r>
+              <a:rPr lang="ja-JP" altLang="en-US" sz="1200" dirty="0" smtClean="0">
+                <a:latin typeface="+mn-ea"/>
+              </a:rPr>
+              <a:t>な分析を</a:t>
+            </a:r>
+            <a:r>
+              <a:rPr lang="en-US" altLang="ja-JP" sz="1200" dirty="0" smtClean="0">
+                <a:latin typeface="+mn-ea"/>
+              </a:rPr>
+              <a:t>P.2</a:t>
+            </a:r>
+            <a:r>
+              <a:rPr lang="ja-JP" altLang="en-US" sz="1200" dirty="0" smtClean="0">
+                <a:latin typeface="+mn-ea"/>
+              </a:rPr>
+              <a:t>で行い</a:t>
+            </a:r>
+            <a:r>
+              <a:rPr lang="en-US" altLang="ja-JP" sz="1200" dirty="0" smtClean="0">
+                <a:latin typeface="+mn-ea"/>
+              </a:rPr>
+              <a:t>,</a:t>
+            </a:r>
+            <a:r>
+              <a:rPr lang="ja-JP" altLang="en-US" sz="1200" dirty="0" smtClean="0">
+                <a:latin typeface="+mn-ea"/>
+              </a:rPr>
+              <a:t>下図</a:t>
+            </a:r>
+            <a:r>
+              <a:rPr lang="ja-JP" altLang="en-US" sz="1200" dirty="0" smtClean="0">
+                <a:latin typeface="+mn-ea"/>
+              </a:rPr>
+              <a:t>のパッケージ構成が導き出されました</a:t>
+            </a:r>
+            <a:r>
+              <a:rPr lang="ja-JP" altLang="en-US" sz="1200" dirty="0" smtClean="0">
+                <a:latin typeface="+mn-ea"/>
+              </a:rPr>
+              <a:t>。パッケージ分けの詳細は</a:t>
+            </a:r>
+            <a:r>
+              <a:rPr lang="en-US" altLang="ja-JP" sz="1200" dirty="0" smtClean="0">
+                <a:latin typeface="+mn-ea"/>
+              </a:rPr>
+              <a:t>P2.</a:t>
+            </a:r>
+            <a:r>
+              <a:rPr lang="ja-JP" altLang="en-US" sz="1200" dirty="0" smtClean="0">
+                <a:latin typeface="+mn-ea"/>
+              </a:rPr>
+              <a:t>構造</a:t>
+            </a:r>
+            <a:r>
+              <a:rPr lang="ja-JP" altLang="en-US" sz="1200" dirty="0" smtClean="0">
+                <a:latin typeface="+mn-ea"/>
+              </a:rPr>
+              <a:t>を</a:t>
+            </a:r>
+            <a:r>
+              <a:rPr lang="ja-JP" altLang="en-US" sz="1200" dirty="0" smtClean="0">
+                <a:latin typeface="+mn-ea"/>
+              </a:rPr>
+              <a:t>参照</a:t>
+            </a:r>
+            <a:r>
+              <a:rPr lang="en-US" altLang="ja-JP" sz="1200" dirty="0" smtClean="0">
+                <a:latin typeface="+mn-ea"/>
+              </a:rPr>
+              <a:t>.</a:t>
+            </a:r>
+            <a:r>
+              <a:rPr lang="ja-JP" altLang="en-US" sz="1200" dirty="0" smtClean="0">
+                <a:latin typeface="+mn-ea"/>
+              </a:rPr>
+              <a:t>要求</a:t>
+            </a:r>
+            <a:r>
+              <a:rPr lang="ja-JP" altLang="en-US" sz="1200" dirty="0" smtClean="0">
+                <a:latin typeface="+mn-ea"/>
+              </a:rPr>
+              <a:t>とパッケージ構成</a:t>
+            </a:r>
+            <a:r>
+              <a:rPr lang="ja-JP" altLang="en-US" sz="1200" dirty="0" smtClean="0">
+                <a:latin typeface="+mn-ea"/>
+              </a:rPr>
+              <a:t>に</a:t>
+            </a:r>
+            <a:r>
+              <a:rPr lang="ja-JP" altLang="en-US" sz="1200" dirty="0" smtClean="0">
+                <a:latin typeface="+mn-ea"/>
+              </a:rPr>
+              <a:t>基づいて構造を分析しました</a:t>
+            </a:r>
+            <a:r>
+              <a:rPr lang="en-US" altLang="ja-JP" sz="1200" dirty="0" smtClean="0">
+                <a:latin typeface="+mn-ea"/>
+              </a:rPr>
+              <a:t>.</a:t>
+            </a:r>
+            <a:r>
+              <a:rPr lang="ja-JP" altLang="en-US" sz="1200" dirty="0" smtClean="0">
+                <a:latin typeface="+mn-ea"/>
+              </a:rPr>
+              <a:t>区間</a:t>
+            </a:r>
+            <a:r>
+              <a:rPr lang="ja-JP" altLang="en-US" sz="1200" dirty="0" smtClean="0">
+                <a:latin typeface="+mn-ea"/>
+              </a:rPr>
+              <a:t>の</a:t>
+            </a:r>
+            <a:r>
+              <a:rPr lang="ja-JP" altLang="en-US" sz="1200" dirty="0" smtClean="0">
+                <a:latin typeface="+mn-ea"/>
+              </a:rPr>
+              <a:t>切り替え</a:t>
+            </a:r>
+            <a:r>
+              <a:rPr lang="ja-JP" altLang="en-US" sz="1200" dirty="0" smtClean="0">
+                <a:latin typeface="+mn-ea"/>
+              </a:rPr>
+              <a:t>と</a:t>
+            </a:r>
+            <a:r>
+              <a:rPr lang="ja-JP" altLang="en-US" sz="1200" dirty="0" smtClean="0">
+                <a:latin typeface="+mn-ea"/>
+              </a:rPr>
+              <a:t>駆動の振る舞い</a:t>
+            </a:r>
+            <a:r>
+              <a:rPr lang="ja-JP" altLang="en-US" sz="1200" dirty="0" smtClean="0">
+                <a:latin typeface="+mn-ea"/>
+              </a:rPr>
+              <a:t>について並行性設計を踏まえながら分析を行うことで実現可能性を検証しました。詳細</a:t>
+            </a:r>
+            <a:r>
+              <a:rPr lang="ja-JP" altLang="en-US" sz="1200" dirty="0" smtClean="0">
+                <a:latin typeface="+mn-ea"/>
+              </a:rPr>
+              <a:t>は</a:t>
+            </a:r>
+            <a:r>
+              <a:rPr lang="en-US" altLang="ja-JP" sz="1200" dirty="0" smtClean="0">
+                <a:latin typeface="+mn-ea"/>
+              </a:rPr>
+              <a:t>P.</a:t>
+            </a:r>
+            <a:r>
+              <a:rPr lang="ja-JP" altLang="en-US" sz="1200" dirty="0" smtClean="0">
+                <a:latin typeface="+mn-ea"/>
+              </a:rPr>
+              <a:t>３振る舞い参照。難所</a:t>
+            </a:r>
+            <a:r>
+              <a:rPr lang="ja-JP" altLang="en-US" sz="1200" dirty="0">
+                <a:latin typeface="+mn-ea"/>
+              </a:rPr>
+              <a:t>を</a:t>
+            </a:r>
+            <a:r>
+              <a:rPr lang="ja-JP" altLang="en-US" sz="1200" dirty="0" smtClean="0">
+                <a:latin typeface="+mn-ea"/>
+              </a:rPr>
+              <a:t>どのように攻略すべきかを</a:t>
+            </a:r>
+            <a:r>
+              <a:rPr lang="en-US" altLang="ja-JP" sz="1200" dirty="0" smtClean="0">
+                <a:latin typeface="+mn-ea"/>
+              </a:rPr>
+              <a:t>4P.</a:t>
+            </a:r>
+            <a:r>
+              <a:rPr lang="ja-JP" altLang="en-US" sz="1200" dirty="0" smtClean="0">
+                <a:latin typeface="+mn-ea"/>
+              </a:rPr>
+              <a:t>に示し</a:t>
+            </a:r>
+            <a:r>
+              <a:rPr lang="ja-JP" altLang="en-US" sz="1200" dirty="0" smtClean="0">
+                <a:latin typeface="+mn-ea"/>
+              </a:rPr>
+              <a:t>、そこで使われている主な要素技術について、</a:t>
+            </a:r>
+            <a:r>
+              <a:rPr lang="en-US" altLang="ja-JP" sz="1200" dirty="0" smtClean="0">
+                <a:latin typeface="+mn-ea"/>
+              </a:rPr>
               <a:t>P.5</a:t>
             </a:r>
             <a:r>
-              <a:rPr lang="ja-JP" altLang="en-US" sz="1200" dirty="0" smtClean="0"/>
-              <a:t>で示しました。</a:t>
-            </a:r>
-            <a:endParaRPr lang="en-US" altLang="ja-JP" sz="1200" dirty="0" smtClean="0"/>
+              <a:rPr lang="ja-JP" altLang="en-US" sz="1200" dirty="0" smtClean="0">
+                <a:latin typeface="+mn-ea"/>
+              </a:rPr>
+              <a:t>要素技術で示しました</a:t>
+            </a:r>
+            <a:r>
+              <a:rPr lang="en-US" altLang="ja-JP" sz="1200" dirty="0">
+                <a:latin typeface="+mn-ea"/>
+              </a:rPr>
+              <a:t>.</a:t>
+            </a:r>
+            <a:endParaRPr lang="en-US" altLang="ja-JP" sz="1200" dirty="0" smtClean="0">
+              <a:latin typeface="+mn-ea"/>
+            </a:endParaRPr>
           </a:p>
           <a:p>
             <a:pPr marL="481013" indent="-481013" defTabSz="1279525">
@@ -33759,7 +34008,9 @@
                 <a:spcPct val="20000"/>
               </a:spcBef>
             </a:pPr>
-            <a:endParaRPr lang="en-US" altLang="ja-JP" sz="1200" dirty="0" smtClean="0"/>
+            <a:endParaRPr lang="en-US" altLang="ja-JP" sz="1200" dirty="0" smtClean="0">
+              <a:latin typeface="+mn-ea"/>
+            </a:endParaRPr>
           </a:p>
           <a:p>
             <a:pPr marL="481013" indent="-481013" defTabSz="1279525">
@@ -33770,7 +34021,9 @@
                 <a:spcPct val="20000"/>
               </a:spcBef>
             </a:pPr>
-            <a:endParaRPr lang="en-US" altLang="ja-JP" sz="1200" dirty="0"/>
+            <a:endParaRPr lang="en-US" altLang="ja-JP" sz="1200" dirty="0">
+              <a:latin typeface="+mn-ea"/>
+            </a:endParaRPr>
           </a:p>
           <a:p>
             <a:pPr marL="481013" indent="-481013" defTabSz="1279525">
@@ -33781,7 +34034,9 @@
                 <a:spcPct val="20000"/>
               </a:spcBef>
             </a:pPr>
-            <a:endParaRPr lang="en-US" altLang="ja-JP" sz="1200" dirty="0" smtClean="0"/>
+            <a:endParaRPr lang="en-US" altLang="ja-JP" sz="1200" dirty="0" smtClean="0">
+              <a:latin typeface="+mn-ea"/>
+            </a:endParaRPr>
           </a:p>
           <a:p>
             <a:pPr marL="481013" indent="-481013" defTabSz="1279525">
@@ -33792,7 +34047,9 @@
                 <a:spcPct val="20000"/>
               </a:spcBef>
             </a:pPr>
-            <a:endParaRPr lang="en-US" altLang="ja-JP" sz="1200" dirty="0" smtClean="0"/>
+            <a:endParaRPr lang="en-US" altLang="ja-JP" sz="1200" dirty="0" smtClean="0">
+              <a:latin typeface="+mn-ea"/>
+            </a:endParaRPr>
           </a:p>
           <a:p>
             <a:pPr marL="481013" indent="-481013" defTabSz="1279525">
@@ -33804,18 +34061,26 @@
               </a:spcBef>
             </a:pPr>
             <a:r>
-              <a:rPr lang="ja-JP" altLang="en-US" sz="1400" b="1" dirty="0" smtClean="0"/>
+              <a:rPr lang="ja-JP" altLang="en-US" sz="1400" b="1" dirty="0" smtClean="0">
+                <a:latin typeface="+mn-ea"/>
+              </a:rPr>
               <a:t>☆</a:t>
             </a:r>
             <a:r>
-              <a:rPr lang="ja-JP" altLang="en-US" sz="1400" b="1" dirty="0"/>
+              <a:rPr lang="ja-JP" altLang="en-US" sz="1400" b="1" dirty="0">
+                <a:latin typeface="+mn-ea"/>
+              </a:rPr>
               <a:t>設計</a:t>
             </a:r>
             <a:r>
-              <a:rPr lang="ja-JP" altLang="en-US" sz="1400" b="1" dirty="0" smtClean="0"/>
+              <a:rPr lang="ja-JP" altLang="en-US" sz="1400" b="1" dirty="0" smtClean="0">
+                <a:latin typeface="+mn-ea"/>
+              </a:rPr>
               <a:t>思想</a:t>
             </a:r>
-            <a:endParaRPr lang="en-US" altLang="ja-JP" sz="1400" b="1" dirty="0"/>
+            <a:endParaRPr lang="en-US" altLang="ja-JP" sz="1400" b="1" dirty="0">
+              <a:latin typeface="+mn-ea"/>
+            </a:endParaRPr>
           </a:p>
           <a:p>
             <a:pPr marL="481013" indent="-481013" defTabSz="1279525">
@@ -33827,46 +34092,74 @@
               </a:spcBef>
             </a:pPr>
             <a:r>
-              <a:rPr lang="en-US" altLang="ja-JP" sz="1600" b="1" dirty="0"/>
+              <a:rPr lang="en-US" altLang="ja-JP" sz="1600" b="1" dirty="0">
+                <a:latin typeface="+mn-ea"/>
+              </a:rPr>
               <a:t>	</a:t>
             </a:r>
             <a:r>
-              <a:rPr lang="ja-JP" altLang="en-US" sz="1200" dirty="0" smtClean="0"/>
+              <a:rPr lang="ja-JP" altLang="en-US" sz="1200" dirty="0" smtClean="0">
+                <a:latin typeface="+mn-ea"/>
+              </a:rPr>
               <a:t>パッケージ分けを開発の初期に行い、責務が分散しないように意識することにより</a:t>
             </a:r>
             <a:r>
-              <a:rPr lang="ja-JP" altLang="en-US" sz="1200" dirty="0"/>
+              <a:rPr lang="ja-JP" altLang="en-US" sz="1200" dirty="0">
+                <a:latin typeface="+mn-ea"/>
+              </a:rPr>
               <a:t>、</a:t>
             </a:r>
             <a:r>
-              <a:rPr lang="ja-JP" altLang="en-US" sz="1200" dirty="0" smtClean="0"/>
+              <a:rPr lang="ja-JP" altLang="en-US" sz="1200" dirty="0" smtClean="0">
+                <a:latin typeface="+mn-ea"/>
+              </a:rPr>
               <a:t>モデルに</a:t>
             </a:r>
             <a:r>
-              <a:rPr lang="ja-JP" altLang="en-US" sz="1200" dirty="0"/>
+              <a:rPr lang="ja-JP" altLang="en-US" sz="1200" dirty="0">
+                <a:latin typeface="+mn-ea"/>
+              </a:rPr>
               <a:t>一貫性を</a:t>
             </a:r>
             <a:r>
-              <a:rPr lang="ja-JP" altLang="en-US" sz="1200" dirty="0" smtClean="0"/>
+              <a:rPr lang="ja-JP" altLang="en-US" sz="1200" dirty="0" smtClean="0">
+                <a:latin typeface="+mn-ea"/>
+              </a:rPr>
               <a:t>持たせました．双方向の関連を禁止しました</a:t>
             </a:r>
             <a:r>
-              <a:rPr lang="en-US" altLang="ja-JP" sz="1200" dirty="0" smtClean="0"/>
+              <a:rPr lang="en-US" altLang="ja-JP" sz="1200" dirty="0" smtClean="0">
+                <a:latin typeface="+mn-ea"/>
+              </a:rPr>
               <a:t>.</a:t>
             </a:r>
             <a:r>
-              <a:rPr lang="ja-JP" altLang="en-US" sz="1200" dirty="0" smtClean="0"/>
+              <a:rPr lang="ja-JP" altLang="en-US" sz="1200" dirty="0" smtClean="0">
+                <a:latin typeface="+mn-ea"/>
+              </a:rPr>
               <a:t>区間の切り替え通知はデザインパターンである</a:t>
             </a:r>
             <a:r>
-              <a:rPr lang="en-US" altLang="ja-JP" sz="1200" dirty="0" smtClean="0"/>
+              <a:rPr lang="en-US" altLang="ja-JP" sz="1200" dirty="0" smtClean="0">
+                <a:latin typeface="+mn-ea"/>
+              </a:rPr>
               <a:t>Observer</a:t>
             </a:r>
             <a:r>
-              <a:rPr lang="ja-JP" altLang="en-US" sz="1200" dirty="0" smtClean="0"/>
-              <a:t>パターンを拡張した構成を用いることで双方向の関連を避けました。区間ごとにチームで分担して開発することにより開発スピードを上げ、結合は区間をつなげることのみで行えるので容易になりました。</a:t>
-            </a:r>
-            <a:endParaRPr lang="en-US" altLang="ja-JP" sz="1200" dirty="0"/>
+              <a:rPr lang="ja-JP" altLang="en-US" sz="1200" dirty="0" smtClean="0">
+                <a:latin typeface="+mn-ea"/>
+              </a:rPr>
+              <a:t>パターンを拡張した構成を用いることで双方向の関連を避けました。区間ごとにチームで分担して開発することにより開発スピードを上げ、結合は区間をつなげることのみで行えるので容易になりました</a:t>
+            </a:r>
+            <a:r>
+              <a:rPr lang="ja-JP" altLang="en-US" sz="1200" dirty="0" smtClean="0">
+                <a:latin typeface="+mn-ea"/>
+              </a:rPr>
+              <a:t>。</a:t>
+            </a:r>
+            <a:endParaRPr lang="en-US" altLang="ja-JP" sz="1200" dirty="0" smtClean="0">
+              <a:latin typeface="+mn-ea"/>
+            </a:endParaRPr>
           </a:p>
           <a:p>
             <a:pPr marL="481013" indent="-481013" defTabSz="1279525">
@@ -33877,14 +34170,9 @@
                 <a:spcPct val="20000"/>
               </a:spcBef>
             </a:pPr>
-            <a:r>
-              <a:rPr lang="ja-JP" altLang="en-US" sz="1400" b="1" dirty="0" smtClean="0"/>
-              <a:t>☆</a:t>
-            </a:r>
-            <a:r>
-              <a:rPr lang="ja-JP" altLang="en-US" sz="1400" b="1" dirty="0"/>
-              <a:t>モデルのここに注目！</a:t>
-            </a:r>
+            <a:endParaRPr lang="en-US" altLang="ja-JP" sz="1200" dirty="0">
+              <a:latin typeface="+mn-ea"/>
+            </a:endParaRPr>
           </a:p>
           <a:p>
             <a:pPr marL="481013" indent="-481013" defTabSz="1279525">
@@ -33896,49 +34184,17 @@
               </a:spcBef>
             </a:pPr>
             <a:r>
-              <a:rPr lang="ja-JP" altLang="en-US" sz="1200" dirty="0"/>
-              <a:t>	</a:t>
-            </a:r>
-            <a:r>
-              <a:rPr lang="ja-JP" altLang="en-US" sz="1200" dirty="0" smtClean="0"/>
-              <a:t>　</a:t>
-            </a:r>
-            <a:r>
-              <a:rPr lang="en-US" altLang="ja-JP" sz="1200" dirty="0" smtClean="0"/>
-              <a:t>ET</a:t>
-            </a:r>
-            <a:r>
-              <a:rPr lang="ja-JP" altLang="en-US" sz="1200" dirty="0"/>
-              <a:t>ロボコンはコースを分割した区間の</a:t>
-            </a:r>
-            <a:r>
-              <a:rPr lang="ja-JP" altLang="en-US" sz="1200" dirty="0" smtClean="0"/>
-              <a:t>連続．その</a:t>
-            </a:r>
-            <a:r>
-              <a:rPr lang="ja-JP" altLang="en-US" sz="1200" dirty="0"/>
-              <a:t>区間に応じたパラメータを設計すれば完走することが</a:t>
-            </a:r>
-            <a:r>
-              <a:rPr lang="ja-JP" altLang="en-US" sz="1200" dirty="0" smtClean="0"/>
-              <a:t>できる．その</a:t>
-            </a:r>
-            <a:r>
-              <a:rPr lang="ja-JP" altLang="en-US" sz="1200" dirty="0"/>
-              <a:t>流れを取り出してモデルに</a:t>
-            </a:r>
-            <a:r>
-              <a:rPr lang="ja-JP" altLang="en-US" sz="1200" dirty="0" smtClean="0"/>
-              <a:t>しました．</a:t>
-            </a:r>
-            <a:r>
-              <a:rPr lang="en-US" altLang="ja-JP" sz="1800" dirty="0"/>
-              <a:t/>
-            </a:r>
-            <a:br>
-              <a:rPr lang="en-US" altLang="ja-JP" sz="1800" dirty="0"/>
-            </a:br>
-            <a:endParaRPr lang="en-US" altLang="ja-JP" sz="1600" dirty="0"/>
+              <a:rPr lang="ja-JP" altLang="en-US" sz="1400" b="1" dirty="0" smtClean="0">
+                <a:latin typeface="+mn-ea"/>
+              </a:rPr>
+              <a:t>☆</a:t>
+            </a:r>
+            <a:r>
+              <a:rPr lang="ja-JP" altLang="en-US" sz="1400" b="1" dirty="0">
+                <a:latin typeface="+mn-ea"/>
+              </a:rPr>
+              <a:t>モデルのここに注目！</a:t>
+            </a:r>
           </a:p>
           <a:p>
             <a:pPr marL="481013" indent="-481013" defTabSz="1279525">
@@ -33950,14 +34206,121 @@
               </a:spcBef>
             </a:pPr>
             <a:r>
-              <a:rPr lang="ja-JP" altLang="en-US" sz="1600" b="1" dirty="0"/>
-              <a:t>☆追加課題への</a:t>
-            </a:r>
-            <a:r>
-              <a:rPr lang="ja-JP" altLang="en-US" sz="1600" b="1" dirty="0" smtClean="0"/>
-              <a:t>取り組み</a:t>
-            </a:r>
-            <a:endParaRPr lang="en-US" altLang="ja-JP" sz="1600" b="1" dirty="0" smtClean="0"/>
+              <a:rPr lang="ja-JP" altLang="en-US" sz="1200" dirty="0">
+                <a:latin typeface="+mn-ea"/>
+              </a:rPr>
+              <a:t>	</a:t>
+            </a:r>
+            <a:r>
+              <a:rPr lang="ja-JP" altLang="en-US" sz="1200" dirty="0" smtClean="0">
+                <a:latin typeface="+mn-ea"/>
+              </a:rPr>
+              <a:t>　</a:t>
+            </a:r>
+            <a:r>
+              <a:rPr lang="en-US" altLang="ja-JP" sz="1200" dirty="0" smtClean="0">
+                <a:latin typeface="+mn-ea"/>
+              </a:rPr>
+              <a:t>ET</a:t>
+            </a:r>
+            <a:r>
+              <a:rPr lang="ja-JP" altLang="en-US" sz="1200" dirty="0">
+                <a:latin typeface="+mn-ea"/>
+              </a:rPr>
+              <a:t>ロボコンはコースを分割した区間の</a:t>
+            </a:r>
+            <a:r>
+              <a:rPr lang="ja-JP" altLang="en-US" sz="1200" dirty="0" smtClean="0">
+                <a:latin typeface="+mn-ea"/>
+              </a:rPr>
+              <a:t>連続．その</a:t>
+            </a:r>
+            <a:r>
+              <a:rPr lang="ja-JP" altLang="en-US" sz="1200" dirty="0">
+                <a:latin typeface="+mn-ea"/>
+              </a:rPr>
+              <a:t>区間に応じた</a:t>
+            </a:r>
+            <a:r>
+              <a:rPr lang="ja-JP" altLang="en-US" sz="1200" dirty="0" smtClean="0">
+                <a:latin typeface="+mn-ea"/>
+              </a:rPr>
+              <a:t>パラメータ</a:t>
+            </a:r>
+            <a:r>
+              <a:rPr lang="ja-JP" altLang="en-US" sz="1200" dirty="0" smtClean="0">
+                <a:latin typeface="+mn-ea"/>
+              </a:rPr>
+              <a:t>と区間切替条件</a:t>
+            </a:r>
+            <a:r>
+              <a:rPr lang="ja-JP" altLang="en-US" sz="1200" dirty="0" smtClean="0">
+                <a:latin typeface="+mn-ea"/>
+              </a:rPr>
+              <a:t>を</a:t>
+            </a:r>
+            <a:r>
+              <a:rPr lang="ja-JP" altLang="en-US" sz="1200" dirty="0">
+                <a:latin typeface="+mn-ea"/>
+              </a:rPr>
+              <a:t>設計すれば完走することが</a:t>
+            </a:r>
+            <a:r>
+              <a:rPr lang="ja-JP" altLang="en-US" sz="1200" dirty="0" smtClean="0">
+                <a:latin typeface="+mn-ea"/>
+              </a:rPr>
+              <a:t>できる</a:t>
+            </a:r>
+            <a:r>
+              <a:rPr lang="ja-JP" altLang="en-US" sz="1200" dirty="0" smtClean="0">
+                <a:latin typeface="+mn-ea"/>
+              </a:rPr>
+              <a:t>．</a:t>
+            </a:r>
+            <a:r>
+              <a:rPr lang="ja-JP" altLang="en-US" sz="1200" dirty="0" smtClean="0">
+                <a:latin typeface="+mn-ea"/>
+              </a:rPr>
+              <a:t>このコンセプトが読み取れる構造</a:t>
+            </a:r>
+            <a:r>
+              <a:rPr lang="en-US" altLang="ja-JP" sz="1200" dirty="0">
+                <a:latin typeface="+mn-ea"/>
+              </a:rPr>
+              <a:t>,</a:t>
+            </a:r>
+            <a:r>
+              <a:rPr lang="ja-JP" altLang="en-US" sz="1200" dirty="0" smtClean="0">
+                <a:latin typeface="+mn-ea"/>
+              </a:rPr>
+              <a:t>振る舞いになっています</a:t>
+            </a:r>
+            <a:r>
+              <a:rPr lang="en-US" altLang="ja-JP" sz="1200" dirty="0" smtClean="0">
+                <a:latin typeface="+mn-ea"/>
+              </a:rPr>
+              <a:t>.</a:t>
+            </a:r>
+            <a:r>
+              <a:rPr lang="ja-JP" altLang="en-US" sz="1200" dirty="0" smtClean="0">
+                <a:latin typeface="+mn-ea"/>
+              </a:rPr>
+              <a:t>そして、責務が明確に別れた単方向・疎結合な構造にご注目ください。</a:t>
+            </a:r>
+            <a:r>
+              <a:rPr lang="en-US" altLang="ja-JP" sz="1800" dirty="0">
+                <a:latin typeface="+mn-ea"/>
+              </a:rPr>
+              <a:t/>
+            </a:r>
+            <a:br>
+              <a:rPr lang="en-US" altLang="ja-JP" sz="1800" dirty="0">
+                <a:latin typeface="+mn-ea"/>
+              </a:rPr>
+            </a:br>
+            <a:endParaRPr lang="en-US" altLang="ja-JP" sz="1600" dirty="0">
+              <a:latin typeface="+mn-ea"/>
+            </a:endParaRPr>
           </a:p>
           <a:p>
             <a:pPr marL="481013" indent="-481013" defTabSz="1279525">
@@ -33969,18 +34332,20 @@
               </a:spcBef>
             </a:pPr>
             <a:r>
-              <a:rPr lang="ja-JP" altLang="en-US" sz="1600" dirty="0"/>
-              <a:t>並行性</a:t>
-            </a:r>
-            <a:r>
-              <a:rPr lang="ja-JP" altLang="en-US" sz="1600" dirty="0" smtClean="0"/>
-              <a:t>設計・要求モデルについて取り組みました。</a:t>
-            </a:r>
-            <a:r>
-              <a:rPr lang="ja-JP" altLang="en-US" sz="1600" b="1" dirty="0"/>
-              <a:t>　</a:t>
-            </a:r>
-            <a:endParaRPr lang="en-US" altLang="ja-JP" sz="1600" b="1" dirty="0" smtClean="0"/>
+              <a:rPr lang="ja-JP" altLang="en-US" sz="1400" b="1" dirty="0">
+                <a:latin typeface="+mn-ea"/>
+              </a:rPr>
+              <a:t>☆追加課題への</a:t>
+            </a:r>
+            <a:r>
+              <a:rPr lang="ja-JP" altLang="en-US" sz="1400" b="1" dirty="0" smtClean="0">
+                <a:latin typeface="+mn-ea"/>
+              </a:rPr>
+              <a:t>取り組み</a:t>
+            </a:r>
+            <a:endParaRPr lang="en-US" altLang="ja-JP" sz="1400" b="1" dirty="0" smtClean="0">
+              <a:latin typeface="+mn-ea"/>
+            </a:endParaRPr>
           </a:p>
           <a:p>
             <a:pPr marL="481013" indent="-481013" defTabSz="1279525">
@@ -33992,276 +34357,431 @@
               </a:spcBef>
             </a:pPr>
             <a:r>
-              <a:rPr lang="ja-JP" altLang="en-US" sz="1600" b="1" dirty="0" smtClean="0"/>
-              <a:t>・</a:t>
-            </a:r>
-            <a:r>
-              <a:rPr lang="ja-JP" altLang="en-US" sz="1400" dirty="0" smtClean="0"/>
-              <a:t>並行性設計について</a:t>
-            </a:r>
-            <a:endParaRPr lang="en-US" altLang="ja-JP" sz="1400" dirty="0" smtClean="0"/>
+              <a:rPr lang="ja-JP" altLang="en-US" sz="1600" dirty="0">
+                <a:latin typeface="+mn-ea"/>
+              </a:rPr>
+              <a:t>並行性</a:t>
+            </a:r>
+            <a:r>
+              <a:rPr lang="ja-JP" altLang="en-US" sz="1600" dirty="0" smtClean="0">
+                <a:latin typeface="+mn-ea"/>
+              </a:rPr>
+              <a:t>設計・要求モデルについて取り組みました。</a:t>
+            </a:r>
+            <a:r>
+              <a:rPr lang="ja-JP" altLang="en-US" sz="1600" b="1" dirty="0">
+                <a:latin typeface="+mn-ea"/>
+              </a:rPr>
+              <a:t>　</a:t>
+            </a:r>
+            <a:endParaRPr lang="en-US" altLang="ja-JP" sz="1600" b="1" dirty="0" smtClean="0">
+              <a:latin typeface="+mn-ea"/>
+            </a:endParaRPr>
           </a:p>
           <a:p>
+            <a:pPr marL="481013" indent="-481013" defTabSz="1279525">
+              <a:lnSpc>
+                <a:spcPct val="80000"/>
+              </a:lnSpc>
+              <a:spcBef>
+                <a:spcPct val="20000"/>
+              </a:spcBef>
+            </a:pPr>
+            <a:r>
+              <a:rPr lang="ja-JP" altLang="en-US" sz="1600" b="1" dirty="0" smtClean="0">
+                <a:latin typeface="+mn-ea"/>
+              </a:rPr>
+              <a:t>・</a:t>
+            </a:r>
+            <a:r>
+              <a:rPr lang="ja-JP" altLang="en-US" sz="1400" dirty="0" smtClean="0">
+                <a:latin typeface="+mn-ea"/>
+              </a:rPr>
+              <a:t>並行性設計について</a:t>
+            </a:r>
+            <a:endParaRPr lang="en-US" altLang="ja-JP" sz="1400" dirty="0" smtClean="0">
+              <a:latin typeface="+mn-ea"/>
+            </a:endParaRPr>
+          </a:p>
+          <a:p>
             <a:r>
               <a:rPr lang="ja-JP" altLang="en-US" sz="1200" dirty="0" smtClean="0">
-                <a:latin typeface="メイリオ" pitchFamily="50" charset="-128"/>
-                <a:ea typeface="メイリオ" pitchFamily="50" charset="-128"/>
+                <a:latin typeface="+mn-ea"/>
                 <a:cs typeface="メイリオ" pitchFamily="50" charset="-128"/>
               </a:rPr>
-              <a:t>・設計指針</a:t>
+              <a:t>設計</a:t>
+            </a:r>
+            <a:r>
+              <a:rPr lang="ja-JP" altLang="en-US" sz="1200" dirty="0" smtClean="0">
+                <a:latin typeface="+mn-ea"/>
+                <a:cs typeface="メイリオ" pitchFamily="50" charset="-128"/>
+              </a:rPr>
+              <a:t>指針</a:t>
             </a:r>
             <a:endParaRPr lang="en-US" altLang="ja-JP" sz="1200" dirty="0" smtClean="0">
-              <a:latin typeface="メイリオ" pitchFamily="50" charset="-128"/>
-              <a:ea typeface="メイリオ" pitchFamily="50" charset="-128"/>
+              <a:latin typeface="+mn-ea"/>
               <a:cs typeface="メイリオ" pitchFamily="50" charset="-128"/>
             </a:endParaRPr>
           </a:p>
           <a:p>
             <a:r>
               <a:rPr lang="ja-JP" altLang="en-US" sz="1200" dirty="0" smtClean="0">
-                <a:latin typeface="メイリオ" pitchFamily="50" charset="-128"/>
-                <a:ea typeface="メイリオ" pitchFamily="50" charset="-128"/>
+                <a:latin typeface="+mn-ea"/>
                 <a:cs typeface="メイリオ" pitchFamily="50" charset="-128"/>
               </a:rPr>
-              <a:t>走行体のバランス動作などのモータの駆動が一番優先するべきことである。それに対して</a:t>
+              <a:t>走行体のバランス動作などのモータの駆動が一番優先するべきこと</a:t>
+            </a:r>
+            <a:r>
+              <a:rPr lang="ja-JP" altLang="en-US" sz="1200" dirty="0" smtClean="0">
+                <a:latin typeface="+mn-ea"/>
+                <a:cs typeface="メイリオ" pitchFamily="50" charset="-128"/>
+              </a:rPr>
+              <a:t>で</a:t>
+            </a:r>
+            <a:r>
+              <a:rPr lang="ja-JP" altLang="en-US" sz="1200" dirty="0" smtClean="0">
+                <a:latin typeface="+mn-ea"/>
+                <a:cs typeface="メイリオ" pitchFamily="50" charset="-128"/>
+              </a:rPr>
+              <a:t>す</a:t>
+            </a:r>
+            <a:r>
+              <a:rPr lang="en-US" altLang="ja-JP" sz="1200" dirty="0">
+                <a:latin typeface="+mn-ea"/>
+                <a:cs typeface="メイリオ" pitchFamily="50" charset="-128"/>
+              </a:rPr>
+              <a:t>.</a:t>
+            </a:r>
+            <a:r>
+              <a:rPr lang="ja-JP" altLang="en-US" sz="1200" dirty="0" smtClean="0">
+                <a:latin typeface="+mn-ea"/>
+                <a:cs typeface="メイリオ" pitchFamily="50" charset="-128"/>
+              </a:rPr>
+              <a:t>それ</a:t>
+            </a:r>
+            <a:r>
+              <a:rPr lang="ja-JP" altLang="en-US" sz="1200" dirty="0" smtClean="0">
+                <a:latin typeface="+mn-ea"/>
+                <a:cs typeface="メイリオ" pitchFamily="50" charset="-128"/>
+              </a:rPr>
+              <a:t>に対して</a:t>
             </a:r>
             <a:r>
               <a:rPr lang="en-US" altLang="ja-JP" sz="1200" dirty="0" smtClean="0">
-                <a:latin typeface="メイリオ" pitchFamily="50" charset="-128"/>
-                <a:ea typeface="メイリオ" pitchFamily="50" charset="-128"/>
+                <a:latin typeface="+mn-ea"/>
                 <a:cs typeface="メイリオ" pitchFamily="50" charset="-128"/>
               </a:rPr>
               <a:t>,</a:t>
             </a:r>
             <a:r>
               <a:rPr lang="ja-JP" altLang="en-US" sz="1200" dirty="0" smtClean="0">
-                <a:latin typeface="メイリオ" pitchFamily="50" charset="-128"/>
-                <a:ea typeface="メイリオ" pitchFamily="50" charset="-128"/>
+                <a:latin typeface="+mn-ea"/>
                 <a:cs typeface="メイリオ" pitchFamily="50" charset="-128"/>
               </a:rPr>
-              <a:t>区間の切替ははるかに遅い周期でも十分に性能は得られると考えた</a:t>
+              <a:t>区間の切替ははるかに遅い周期でも十分に性能は得られると</a:t>
+            </a:r>
+            <a:r>
+              <a:rPr lang="ja-JP" altLang="en-US" sz="1200" dirty="0" smtClean="0">
+                <a:latin typeface="+mn-ea"/>
+                <a:cs typeface="メイリオ" pitchFamily="50" charset="-128"/>
+              </a:rPr>
+              <a:t>考えました</a:t>
             </a:r>
             <a:r>
               <a:rPr lang="en-US" altLang="ja-JP" sz="1200" dirty="0" smtClean="0">
-                <a:latin typeface="メイリオ" pitchFamily="50" charset="-128"/>
-                <a:ea typeface="メイリオ" pitchFamily="50" charset="-128"/>
+                <a:latin typeface="+mn-ea"/>
                 <a:cs typeface="メイリオ" pitchFamily="50" charset="-128"/>
               </a:rPr>
               <a:t>.</a:t>
             </a:r>
             <a:r>
               <a:rPr lang="ja-JP" altLang="en-US" sz="1200" dirty="0" smtClean="0">
-                <a:latin typeface="メイリオ" pitchFamily="50" charset="-128"/>
-                <a:ea typeface="メイリオ" pitchFamily="50" charset="-128"/>
+                <a:latin typeface="+mn-ea"/>
                 <a:cs typeface="メイリオ" pitchFamily="50" charset="-128"/>
               </a:rPr>
-              <a:t>よって駆動関連を一番高い優先度のタスクとし、それ以外は駆動よりも優先度が低いタスクとすることで、駆動が確実に必要な周期で</a:t>
-            </a:r>
-            <a:r>
-              <a:rPr lang="ja-JP" altLang="en-US" sz="1200" dirty="0" err="1" smtClean="0">
-                <a:latin typeface="メイリオ" pitchFamily="50" charset="-128"/>
-                <a:ea typeface="メイリオ" pitchFamily="50" charset="-128"/>
+              <a:t>その根拠の詳細は</a:t>
+            </a:r>
+            <a:r>
+              <a:rPr lang="en-US" altLang="ja-JP" sz="1200" dirty="0" smtClean="0">
+                <a:latin typeface="+mn-ea"/>
                 <a:cs typeface="メイリオ" pitchFamily="50" charset="-128"/>
               </a:rPr>
-              <a:t>に</a:t>
+              <a:t>P3.</a:t>
             </a:r>
             <a:r>
               <a:rPr lang="ja-JP" altLang="en-US" sz="1200" dirty="0" smtClean="0">
-                <a:latin typeface="メイリオ" pitchFamily="50" charset="-128"/>
-                <a:ea typeface="メイリオ" pitchFamily="50" charset="-128"/>
+                <a:latin typeface="+mn-ea"/>
                 <a:cs typeface="メイリオ" pitchFamily="50" charset="-128"/>
               </a:rPr>
-              <a:t>行われるように設計した。詳細は</a:t>
+              <a:t>振る舞い参照</a:t>
             </a:r>
             <a:r>
               <a:rPr lang="en-US" altLang="ja-JP" sz="1200" dirty="0" smtClean="0">
-                <a:latin typeface="メイリオ" pitchFamily="50" charset="-128"/>
-                <a:ea typeface="メイリオ" pitchFamily="50" charset="-128"/>
+                <a:latin typeface="+mn-ea"/>
                 <a:cs typeface="メイリオ" pitchFamily="50" charset="-128"/>
               </a:rPr>
-              <a:t>P.3</a:t>
+              <a:t>.</a:t>
             </a:r>
             <a:r>
               <a:rPr lang="ja-JP" altLang="en-US" sz="1200" dirty="0" smtClean="0">
-                <a:latin typeface="メイリオ" pitchFamily="50" charset="-128"/>
-                <a:ea typeface="メイリオ" pitchFamily="50" charset="-128"/>
+                <a:latin typeface="+mn-ea"/>
                 <a:cs typeface="メイリオ" pitchFamily="50" charset="-128"/>
               </a:rPr>
-              <a:t>並行性設計参照</a:t>
+              <a:t>よって</a:t>
+            </a:r>
+            <a:r>
+              <a:rPr lang="ja-JP" altLang="en-US" sz="1200" dirty="0" smtClean="0">
+                <a:latin typeface="+mn-ea"/>
+                <a:cs typeface="メイリオ" pitchFamily="50" charset="-128"/>
+              </a:rPr>
+              <a:t>駆動関連を一番高い優先度のタスクと</a:t>
+            </a:r>
+            <a:r>
+              <a:rPr lang="ja-JP" altLang="en-US" sz="1200" dirty="0" smtClean="0">
+                <a:latin typeface="+mn-ea"/>
+                <a:cs typeface="メイリオ" pitchFamily="50" charset="-128"/>
+              </a:rPr>
+              <a:t>し</a:t>
             </a:r>
             <a:r>
               <a:rPr lang="en-US" altLang="ja-JP" sz="1200" dirty="0" smtClean="0">
-                <a:latin typeface="メイリオ" pitchFamily="50" charset="-128"/>
-                <a:ea typeface="メイリオ" pitchFamily="50" charset="-128"/>
+                <a:latin typeface="+mn-ea"/>
                 <a:cs typeface="メイリオ" pitchFamily="50" charset="-128"/>
               </a:rPr>
-              <a:t>.</a:t>
-            </a:r>
-          </a:p>
-          <a:p>
+              <a:t>,</a:t>
+            </a:r>
+            <a:r>
+              <a:rPr lang="ja-JP" altLang="en-US" sz="1200" dirty="0" smtClean="0">
+                <a:latin typeface="+mn-ea"/>
+                <a:cs typeface="メイリオ" pitchFamily="50" charset="-128"/>
+              </a:rPr>
+              <a:t>それ</a:t>
+            </a:r>
+            <a:r>
+              <a:rPr lang="ja-JP" altLang="en-US" sz="1200" dirty="0" smtClean="0">
+                <a:latin typeface="+mn-ea"/>
+                <a:cs typeface="メイリオ" pitchFamily="50" charset="-128"/>
+              </a:rPr>
+              <a:t>以外は駆動よりも優先度が低いタスクとすること</a:t>
+            </a:r>
+            <a:r>
+              <a:rPr lang="ja-JP" altLang="en-US" sz="1200" dirty="0" smtClean="0">
+                <a:latin typeface="+mn-ea"/>
+                <a:cs typeface="メイリオ" pitchFamily="50" charset="-128"/>
+              </a:rPr>
+              <a:t>で</a:t>
+            </a:r>
+            <a:r>
+              <a:rPr lang="en-US" altLang="ja-JP" sz="1200" dirty="0">
+                <a:latin typeface="+mn-ea"/>
+                <a:cs typeface="メイリオ" pitchFamily="50" charset="-128"/>
+              </a:rPr>
+              <a:t>,</a:t>
+            </a:r>
+            <a:r>
+              <a:rPr lang="ja-JP" altLang="en-US" sz="1200" dirty="0" smtClean="0">
+                <a:latin typeface="+mn-ea"/>
+                <a:cs typeface="メイリオ" pitchFamily="50" charset="-128"/>
+              </a:rPr>
+              <a:t>駆動</a:t>
+            </a:r>
             <a:r>
               <a:rPr lang="ja-JP" altLang="en-US" sz="1200" dirty="0">
-                <a:latin typeface="メイリオ" pitchFamily="50" charset="-128"/>
-                <a:ea typeface="メイリオ" pitchFamily="50" charset="-128"/>
+                <a:latin typeface="+mn-ea"/>
                 <a:cs typeface="メイリオ" pitchFamily="50" charset="-128"/>
               </a:rPr>
-              <a:t>タスク</a:t>
+              <a:t>が求められる</a:t>
             </a:r>
             <a:r>
               <a:rPr lang="ja-JP" altLang="en-US" sz="1200" dirty="0" smtClean="0">
-                <a:latin typeface="メイリオ" pitchFamily="50" charset="-128"/>
-                <a:ea typeface="メイリオ" pitchFamily="50" charset="-128"/>
+                <a:latin typeface="+mn-ea"/>
                 <a:cs typeface="メイリオ" pitchFamily="50" charset="-128"/>
               </a:rPr>
-              <a:t>の構造を示すために２つのステレオタイプを用いた</a:t>
-            </a:r>
-            <a:r>
-              <a:rPr lang="en-US" altLang="ja-JP" sz="1200" dirty="0" smtClean="0">
-                <a:latin typeface="メイリオ" pitchFamily="50" charset="-128"/>
-                <a:ea typeface="メイリオ" pitchFamily="50" charset="-128"/>
+              <a:t>周期で確実に</a:t>
+            </a:r>
+            <a:r>
+              <a:rPr lang="ja-JP" altLang="en-US" sz="1200" dirty="0" smtClean="0">
+                <a:latin typeface="+mn-ea"/>
                 <a:cs typeface="メイリオ" pitchFamily="50" charset="-128"/>
               </a:rPr>
-              <a:t>.</a:t>
+              <a:t>行われる</a:t>
             </a:r>
             <a:r>
               <a:rPr lang="ja-JP" altLang="en-US" sz="1200" dirty="0" smtClean="0">
-                <a:latin typeface="メイリオ" pitchFamily="50" charset="-128"/>
-                <a:ea typeface="メイリオ" pitchFamily="50" charset="-128"/>
+                <a:latin typeface="+mn-ea"/>
                 <a:cs typeface="メイリオ" pitchFamily="50" charset="-128"/>
               </a:rPr>
-              <a:t>採用する</a:t>
-            </a:r>
-            <a:r>
-              <a:rPr lang="en-US" altLang="ja-JP" sz="1200" dirty="0" smtClean="0">
-                <a:latin typeface="メイリオ" pitchFamily="50" charset="-128"/>
-                <a:ea typeface="メイリオ" pitchFamily="50" charset="-128"/>
+              <a:t>ように設計した</a:t>
+            </a:r>
+            <a:r>
+              <a:rPr lang="ja-JP" altLang="en-US" sz="1200" dirty="0" smtClean="0">
+                <a:latin typeface="+mn-ea"/>
                 <a:cs typeface="メイリオ" pitchFamily="50" charset="-128"/>
               </a:rPr>
-              <a:t>RTOS</a:t>
-            </a:r>
-            <a:r>
-              <a:rPr lang="ja-JP" altLang="en-US" sz="1200" dirty="0" err="1" smtClean="0">
-                <a:latin typeface="メイリオ" pitchFamily="50" charset="-128"/>
-                <a:ea typeface="メイリオ" pitchFamily="50" charset="-128"/>
-                <a:cs typeface="メイリオ" pitchFamily="50" charset="-128"/>
-              </a:rPr>
-              <a:t>の提</a:t>
-            </a:r>
-            <a:r>
-              <a:rPr lang="ja-JP" altLang="en-US" sz="1200" dirty="0" smtClean="0">
-                <a:latin typeface="メイリオ" pitchFamily="50" charset="-128"/>
-                <a:ea typeface="メイリオ" pitchFamily="50" charset="-128"/>
-                <a:cs typeface="メイリオ" pitchFamily="50" charset="-128"/>
-              </a:rPr>
-              <a:t>供する機能を</a:t>
-            </a:r>
-            <a:r>
-              <a:rPr lang="en-US" altLang="ja-JP" sz="1200" dirty="0" err="1" smtClean="0">
-                <a:latin typeface="メイリオ" pitchFamily="50" charset="-128"/>
-                <a:ea typeface="メイリオ" pitchFamily="50" charset="-128"/>
-                <a:cs typeface="メイリオ" pitchFamily="50" charset="-128"/>
-              </a:rPr>
-              <a:t>nxtOSEK</a:t>
-            </a:r>
-            <a:r>
-              <a:rPr lang="en-US" altLang="ja-JP" sz="1200" dirty="0" smtClean="0">
-                <a:latin typeface="メイリオ" pitchFamily="50" charset="-128"/>
-                <a:ea typeface="メイリオ" pitchFamily="50" charset="-128"/>
-                <a:cs typeface="メイリオ" pitchFamily="50" charset="-128"/>
-              </a:rPr>
-              <a:t>,</a:t>
-            </a:r>
-            <a:r>
-              <a:rPr lang="ja-JP" altLang="en-US" sz="1200" dirty="0" smtClean="0">
-                <a:latin typeface="メイリオ" pitchFamily="50" charset="-128"/>
-                <a:ea typeface="メイリオ" pitchFamily="50" charset="-128"/>
-                <a:cs typeface="メイリオ" pitchFamily="50" charset="-128"/>
-              </a:rPr>
-              <a:t>ひとつひとつのタスクを</a:t>
-            </a:r>
-            <a:r>
-              <a:rPr lang="en-US" altLang="ja-JP" sz="1200" dirty="0" smtClean="0">
-                <a:latin typeface="メイリオ" pitchFamily="50" charset="-128"/>
-                <a:ea typeface="メイリオ" pitchFamily="50" charset="-128"/>
-                <a:cs typeface="メイリオ" pitchFamily="50" charset="-128"/>
-              </a:rPr>
-              <a:t>TASK</a:t>
-            </a:r>
-            <a:r>
-              <a:rPr lang="ja-JP" altLang="en-US" sz="1200" dirty="0" smtClean="0">
-                <a:latin typeface="メイリオ" pitchFamily="50" charset="-128"/>
-                <a:ea typeface="メイリオ" pitchFamily="50" charset="-128"/>
-                <a:cs typeface="メイリオ" pitchFamily="50" charset="-128"/>
-              </a:rPr>
-              <a:t>としました</a:t>
-            </a:r>
-            <a:r>
-              <a:rPr lang="en-US" altLang="ja-JP" sz="1200" dirty="0" smtClean="0">
-                <a:latin typeface="メイリオ" pitchFamily="50" charset="-128"/>
-                <a:ea typeface="メイリオ" pitchFamily="50" charset="-128"/>
-                <a:cs typeface="メイリオ" pitchFamily="50" charset="-128"/>
-              </a:rPr>
-              <a:t>.</a:t>
-            </a:r>
-          </a:p>
-          <a:p>
-            <a:endParaRPr lang="en-US" altLang="ja-JP" sz="1200" dirty="0">
-              <a:latin typeface="メイリオ" pitchFamily="50" charset="-128"/>
-              <a:ea typeface="メイリオ" pitchFamily="50" charset="-128"/>
+              <a:t>。</a:t>
+            </a:r>
+            <a:endParaRPr lang="en-US" altLang="ja-JP" sz="1200" dirty="0" smtClean="0">
+              <a:latin typeface="+mn-ea"/>
               <a:cs typeface="メイリオ" pitchFamily="50" charset="-128"/>
             </a:endParaRPr>
           </a:p>
           <a:p>
             <a:r>
               <a:rPr lang="ja-JP" altLang="en-US" sz="1200" dirty="0" smtClean="0">
-                <a:latin typeface="メイリオ" pitchFamily="50" charset="-128"/>
-                <a:ea typeface="メイリオ" pitchFamily="50" charset="-128"/>
+                <a:latin typeface="+mn-ea"/>
                 <a:cs typeface="メイリオ" pitchFamily="50" charset="-128"/>
               </a:rPr>
-              <a:t>・</a:t>
-            </a:r>
-            <a:r>
-              <a:rPr lang="ja-JP" altLang="en-US" sz="1400" dirty="0" smtClean="0">
-                <a:latin typeface="メイリオ" pitchFamily="50" charset="-128"/>
-                <a:ea typeface="メイリオ" pitchFamily="50" charset="-128"/>
+              <a:t>なお</a:t>
+            </a:r>
+            <a:r>
+              <a:rPr lang="en-US" altLang="ja-JP" sz="1200" dirty="0" smtClean="0">
+                <a:latin typeface="+mn-ea"/>
                 <a:cs typeface="メイリオ" pitchFamily="50" charset="-128"/>
               </a:rPr>
-              <a:t>要求モデルについて</a:t>
-            </a:r>
-            <a:endParaRPr lang="en-US" altLang="ja-JP" sz="1400" dirty="0" smtClean="0">
-              <a:latin typeface="メイリオ" pitchFamily="50" charset="-128"/>
-              <a:ea typeface="メイリオ" pitchFamily="50" charset="-128"/>
+              <a:t>,</a:t>
+            </a:r>
+            <a:r>
+              <a:rPr lang="ja-JP" altLang="en-US" sz="1200" dirty="0" smtClean="0">
+                <a:latin typeface="+mn-ea"/>
+                <a:cs typeface="メイリオ" pitchFamily="50" charset="-128"/>
+              </a:rPr>
+              <a:t>タスク</a:t>
+            </a:r>
+            <a:r>
+              <a:rPr lang="ja-JP" altLang="en-US" sz="1200" dirty="0" smtClean="0">
+                <a:latin typeface="+mn-ea"/>
+                <a:cs typeface="メイリオ" pitchFamily="50" charset="-128"/>
+              </a:rPr>
+              <a:t>の構造を示すために２つのステレオタイプを用いた</a:t>
+            </a:r>
+            <a:r>
+              <a:rPr lang="en-US" altLang="ja-JP" sz="1200" dirty="0" smtClean="0">
+                <a:latin typeface="+mn-ea"/>
+                <a:cs typeface="メイリオ" pitchFamily="50" charset="-128"/>
+              </a:rPr>
+              <a:t>.</a:t>
+            </a:r>
+            <a:r>
+              <a:rPr lang="ja-JP" altLang="en-US" sz="1200" dirty="0" smtClean="0">
+                <a:latin typeface="+mn-ea"/>
+                <a:cs typeface="メイリオ" pitchFamily="50" charset="-128"/>
+              </a:rPr>
+              <a:t>採用する</a:t>
+            </a:r>
+            <a:r>
+              <a:rPr lang="en-US" altLang="ja-JP" sz="1200" dirty="0" smtClean="0">
+                <a:latin typeface="+mn-ea"/>
+                <a:cs typeface="メイリオ" pitchFamily="50" charset="-128"/>
+              </a:rPr>
+              <a:t>RTOS</a:t>
+            </a:r>
+            <a:r>
+              <a:rPr lang="ja-JP" altLang="en-US" sz="1200" dirty="0" err="1" smtClean="0">
+                <a:latin typeface="+mn-ea"/>
+                <a:cs typeface="メイリオ" pitchFamily="50" charset="-128"/>
+              </a:rPr>
+              <a:t>の提</a:t>
+            </a:r>
+            <a:r>
+              <a:rPr lang="ja-JP" altLang="en-US" sz="1200" dirty="0" smtClean="0">
+                <a:latin typeface="+mn-ea"/>
+                <a:cs typeface="メイリオ" pitchFamily="50" charset="-128"/>
+              </a:rPr>
+              <a:t>供する機能を</a:t>
+            </a:r>
+            <a:r>
+              <a:rPr lang="en-US" altLang="ja-JP" sz="1200" dirty="0" err="1" smtClean="0">
+                <a:latin typeface="+mn-ea"/>
+                <a:cs typeface="メイリオ" pitchFamily="50" charset="-128"/>
+              </a:rPr>
+              <a:t>nxtOSEK</a:t>
+            </a:r>
+            <a:r>
+              <a:rPr lang="en-US" altLang="ja-JP" sz="1200" dirty="0" smtClean="0">
+                <a:latin typeface="+mn-ea"/>
+                <a:cs typeface="メイリオ" pitchFamily="50" charset="-128"/>
+              </a:rPr>
+              <a:t>,</a:t>
+            </a:r>
+            <a:r>
+              <a:rPr lang="ja-JP" altLang="en-US" sz="1200" dirty="0" smtClean="0">
+                <a:latin typeface="+mn-ea"/>
+                <a:cs typeface="メイリオ" pitchFamily="50" charset="-128"/>
+              </a:rPr>
+              <a:t>ひとつひとつのタスクを</a:t>
+            </a:r>
+            <a:r>
+              <a:rPr lang="en-US" altLang="ja-JP" sz="1200" dirty="0" smtClean="0">
+                <a:latin typeface="+mn-ea"/>
+                <a:cs typeface="メイリオ" pitchFamily="50" charset="-128"/>
+              </a:rPr>
+              <a:t>TASK</a:t>
+            </a:r>
+            <a:r>
+              <a:rPr lang="ja-JP" altLang="en-US" sz="1200" dirty="0" smtClean="0">
+                <a:latin typeface="+mn-ea"/>
+                <a:cs typeface="メイリオ" pitchFamily="50" charset="-128"/>
+              </a:rPr>
+              <a:t>としました</a:t>
+            </a:r>
+            <a:r>
+              <a:rPr lang="en-US" altLang="ja-JP" sz="1200" dirty="0" smtClean="0">
+                <a:latin typeface="+mn-ea"/>
+                <a:cs typeface="メイリオ" pitchFamily="50" charset="-128"/>
+              </a:rPr>
+              <a:t>.</a:t>
+            </a:r>
+          </a:p>
+          <a:p>
+            <a:endParaRPr lang="en-US" altLang="ja-JP" sz="1200" dirty="0">
+              <a:latin typeface="+mn-ea"/>
               <a:cs typeface="メイリオ" pitchFamily="50" charset="-128"/>
             </a:endParaRPr>
           </a:p>
           <a:p>
             <a:r>
               <a:rPr lang="ja-JP" altLang="en-US" sz="1200" dirty="0" smtClean="0">
-                <a:latin typeface="メイリオ" pitchFamily="50" charset="-128"/>
-                <a:ea typeface="メイリオ" pitchFamily="50" charset="-128"/>
+                <a:latin typeface="+mn-ea"/>
                 <a:cs typeface="メイリオ" pitchFamily="50" charset="-128"/>
               </a:rPr>
+              <a:t>・</a:t>
+            </a:r>
+            <a:r>
+              <a:rPr lang="ja-JP" altLang="en-US" sz="1400" dirty="0" smtClean="0">
+                <a:latin typeface="+mn-ea"/>
+                <a:cs typeface="メイリオ" pitchFamily="50" charset="-128"/>
+              </a:rPr>
+              <a:t>要求モデルについて</a:t>
+            </a:r>
+            <a:endParaRPr lang="en-US" altLang="ja-JP" sz="1400" dirty="0" smtClean="0">
+              <a:latin typeface="+mn-ea"/>
+              <a:cs typeface="メイリオ" pitchFamily="50" charset="-128"/>
+            </a:endParaRPr>
+          </a:p>
+          <a:p>
+            <a:r>
+              <a:rPr lang="ja-JP" altLang="en-US" sz="1200" dirty="0" smtClean="0">
+                <a:latin typeface="+mn-ea"/>
+                <a:cs typeface="メイリオ" pitchFamily="50" charset="-128"/>
+              </a:rPr>
               <a:t>大会における目標について</a:t>
             </a:r>
             <a:r>
               <a:rPr lang="en-US" altLang="ja-JP" sz="1200" dirty="0" err="1" smtClean="0">
-                <a:latin typeface="メイリオ" pitchFamily="50" charset="-128"/>
-                <a:ea typeface="メイリオ" pitchFamily="50" charset="-128"/>
+                <a:latin typeface="+mn-ea"/>
                 <a:cs typeface="メイリオ" pitchFamily="50" charset="-128"/>
               </a:rPr>
               <a:t>SysML</a:t>
             </a:r>
             <a:r>
               <a:rPr lang="ja-JP" altLang="en-US" sz="1200" dirty="0" smtClean="0">
-                <a:latin typeface="メイリオ" pitchFamily="50" charset="-128"/>
-                <a:ea typeface="メイリオ" pitchFamily="50" charset="-128"/>
+                <a:latin typeface="+mn-ea"/>
                 <a:cs typeface="メイリオ" pitchFamily="50" charset="-128"/>
               </a:rPr>
               <a:t>の要求図を使って分析しました。そこから機能要件、非機能要件を洗い出して、構造、振る舞い、走行戦略で使われる技術要素を導きだしました。</a:t>
             </a:r>
             <a:endParaRPr lang="en-US" altLang="ja-JP" sz="1200" dirty="0" smtClean="0">
-              <a:latin typeface="メイリオ" pitchFamily="50" charset="-128"/>
-              <a:ea typeface="メイリオ" pitchFamily="50" charset="-128"/>
+              <a:latin typeface="+mn-ea"/>
               <a:cs typeface="メイリオ" pitchFamily="50" charset="-128"/>
             </a:endParaRPr>
           </a:p>
@@ -34320,18 +34840,26 @@
               </a:spcBef>
             </a:pPr>
             <a:r>
-              <a:rPr lang="en-US" altLang="ja-JP" sz="2000" b="1" dirty="0"/>
+              <a:rPr lang="en-US" altLang="ja-JP" sz="2000" b="1" dirty="0">
+                <a:latin typeface="+mn-ea"/>
+              </a:rPr>
               <a:t>☆</a:t>
             </a:r>
             <a:r>
-              <a:rPr lang="ja-JP" altLang="en-US" sz="2000" b="1" dirty="0"/>
+              <a:rPr lang="ja-JP" altLang="en-US" sz="2000" b="1" dirty="0">
+                <a:latin typeface="+mn-ea"/>
+              </a:rPr>
               <a:t>チーム</a:t>
             </a:r>
             <a:r>
-              <a:rPr lang="ja-JP" altLang="en-US" sz="2000" b="1" dirty="0" smtClean="0"/>
+              <a:rPr lang="ja-JP" altLang="en-US" sz="2000" b="1" dirty="0" smtClean="0">
+                <a:latin typeface="+mn-ea"/>
+              </a:rPr>
               <a:t>紹介</a:t>
             </a:r>
-            <a:endParaRPr lang="en-US" altLang="ja-JP" sz="1800" b="1" dirty="0"/>
+            <a:endParaRPr lang="en-US" altLang="ja-JP" sz="1800" b="1" dirty="0">
+              <a:latin typeface="+mn-ea"/>
+            </a:endParaRPr>
           </a:p>
           <a:p>
             <a:pPr marL="481013" indent="-481013" defTabSz="1279525">
@@ -34342,7 +34870,9 @@
                 <a:spcPct val="20000"/>
               </a:spcBef>
             </a:pPr>
-            <a:endParaRPr lang="en-US" altLang="ja-JP" sz="1100" b="1" dirty="0"/>
+            <a:endParaRPr lang="en-US" altLang="ja-JP" sz="1100" b="1" dirty="0">
+              <a:latin typeface="+mn-ea"/>
+            </a:endParaRPr>
           </a:p>
           <a:p>
             <a:pPr marL="481013" indent="-481013" defTabSz="1279525">
@@ -34354,26 +34884,38 @@
               </a:spcBef>
             </a:pPr>
             <a:r>
-              <a:rPr lang="ja-JP" altLang="en-US" sz="1100" b="1" dirty="0" smtClean="0"/>
+              <a:rPr lang="ja-JP" altLang="en-US" sz="1100" b="1" dirty="0" smtClean="0">
+                <a:latin typeface="+mn-ea"/>
+              </a:rPr>
               <a:t>　　　</a:t>
             </a:r>
             <a:r>
-              <a:rPr lang="ja-JP" altLang="en-US" sz="1600" b="1" dirty="0" smtClean="0"/>
+              <a:rPr lang="ja-JP" altLang="en-US" sz="1600" b="1" dirty="0" smtClean="0">
+                <a:latin typeface="+mn-ea"/>
+              </a:rPr>
               <a:t>　</a:t>
             </a:r>
             <a:r>
-              <a:rPr lang="ja-JP" altLang="en-US" sz="1600" dirty="0" smtClean="0"/>
+              <a:rPr lang="ja-JP" altLang="en-US" sz="1600" dirty="0" smtClean="0">
+                <a:latin typeface="+mn-ea"/>
+              </a:rPr>
               <a:t>高専の３年生から７年生（専攻科２年生）７名で構成幅広い年代のチームです。メンバーが入院するといったトラブルに見みまわわれながらも、お互いをカバーし合いながら取り組んできました。この大会を通して技術的な面だけで無く</a:t>
             </a:r>
             <a:r>
-              <a:rPr lang="ja-JP" altLang="en-US" sz="1600" dirty="0"/>
+              <a:rPr lang="ja-JP" altLang="en-US" sz="1600" dirty="0">
+                <a:latin typeface="+mn-ea"/>
+              </a:rPr>
               <a:t>常に</a:t>
             </a:r>
             <a:r>
-              <a:rPr lang="ja-JP" altLang="en-US" sz="1600" dirty="0" smtClean="0"/>
+              <a:rPr lang="ja-JP" altLang="en-US" sz="1600" dirty="0" smtClean="0">
+                <a:latin typeface="+mn-ea"/>
+              </a:rPr>
               <a:t>なにか得ようと、自らを向上させようという姿勢がありました。こんなチームで大会に望みます。</a:t>
             </a:r>
-            <a:endParaRPr lang="en-US" altLang="ja-JP" sz="1100" dirty="0"/>
+            <a:endParaRPr lang="en-US" altLang="ja-JP" sz="1100" dirty="0">
+              <a:latin typeface="+mn-ea"/>
+            </a:endParaRPr>
           </a:p>
           <a:p>
             <a:pPr marL="481013" indent="-481013" defTabSz="1279525">
@@ -34385,7 +34927,9 @@
               </a:spcBef>
             </a:pPr>
             <a:r>
-              <a:rPr lang="en-US" altLang="ja-JP" sz="1800" dirty="0" smtClean="0"/>
+              <a:rPr lang="en-US" altLang="ja-JP" sz="1800" dirty="0" smtClean="0">
+                <a:latin typeface="+mn-ea"/>
+              </a:rPr>
               <a:t>	</a:t>
             </a:r>
           </a:p>
@@ -34399,11 +34943,15 @@
               </a:spcBef>
             </a:pPr>
             <a:r>
-              <a:rPr lang="ja-JP" altLang="en-US" sz="1800" b="1" dirty="0" smtClean="0"/>
+              <a:rPr lang="ja-JP" altLang="en-US" sz="1800" b="1" dirty="0" smtClean="0">
+                <a:latin typeface="+mn-ea"/>
+              </a:rPr>
               <a:t>☆組込み，そして</a:t>
             </a:r>
             <a:r>
-              <a:rPr lang="ja-JP" altLang="en-US" sz="1800" b="1" dirty="0"/>
+              <a:rPr lang="ja-JP" altLang="en-US" sz="1800" b="1" dirty="0">
+                <a:latin typeface="+mn-ea"/>
+              </a:rPr>
               <a:t>モデリングの未来へ一言</a:t>
             </a:r>
           </a:p>
@@ -34417,46 +34965,98 @@
               </a:spcBef>
             </a:pPr>
             <a:r>
-              <a:rPr lang="en-US" altLang="ja-JP" sz="1600" dirty="0"/>
+              <a:rPr lang="en-US" altLang="ja-JP" sz="1600" dirty="0">
+                <a:latin typeface="+mn-ea"/>
+              </a:rPr>
               <a:t>	</a:t>
             </a:r>
             <a:r>
-              <a:rPr lang="ja-JP" altLang="en-US" sz="1600" dirty="0" smtClean="0"/>
+              <a:rPr lang="ja-JP" altLang="en-US" sz="1600" dirty="0" smtClean="0">
+                <a:latin typeface="+mn-ea"/>
+              </a:rPr>
               <a:t>　モデリングの根底に流れる重要な考え方のひとつは「抽象化思考」です。これは新しい</a:t>
             </a:r>
             <a:r>
-              <a:rPr lang="ja-JP" altLang="en-US" sz="1600" dirty="0"/>
+              <a:rPr lang="ja-JP" altLang="en-US" sz="1600" dirty="0">
+                <a:latin typeface="+mn-ea"/>
+              </a:rPr>
               <a:t>技術</a:t>
             </a:r>
             <a:r>
-              <a:rPr lang="ja-JP" altLang="en-US" sz="1600" dirty="0" smtClean="0"/>
-              <a:t>がどんどん出てくるこの分野でも廃れることなく常に通用する技術です。組込みシステム</a:t>
-            </a:r>
-            <a:r>
-              <a:rPr lang="ja-JP" altLang="en-US" sz="1600" dirty="0"/>
+              <a:rPr lang="ja-JP" altLang="en-US" sz="1600" dirty="0" smtClean="0">
+                <a:latin typeface="+mn-ea"/>
+              </a:rPr>
+              <a:t>が</a:t>
+            </a:r>
+            <a:r>
+              <a:rPr lang="ja-JP" altLang="en-US" sz="1600" dirty="0" smtClean="0">
+                <a:latin typeface="+mn-ea"/>
+              </a:rPr>
+              <a:t>どんどん登場しても廃れる</a:t>
+            </a:r>
+            <a:r>
+              <a:rPr lang="ja-JP" altLang="en-US" sz="1600" dirty="0" smtClean="0">
+                <a:latin typeface="+mn-ea"/>
+              </a:rPr>
+              <a:t>ことなく常に通用する技術です。組込みシステム</a:t>
+            </a:r>
+            <a:r>
+              <a:rPr lang="ja-JP" altLang="en-US" sz="1600" dirty="0">
+                <a:latin typeface="+mn-ea"/>
+              </a:rPr>
               <a:t>が肥大化する</a:t>
             </a:r>
             <a:r>
-              <a:rPr lang="ja-JP" altLang="en-US" sz="1600" dirty="0" smtClean="0"/>
+              <a:rPr lang="ja-JP" altLang="en-US" sz="1600" dirty="0" smtClean="0">
+                <a:latin typeface="+mn-ea"/>
+              </a:rPr>
               <a:t>昨今、この技術を手に入れることは、当然の流れと言えます。若手社会人や学生が参加するこのコンテストを通してこの武器が広く日本に普及すれば、組み込み業界だけ</a:t>
             </a:r>
             <a:r>
-              <a:rPr lang="ja-JP" altLang="en-US" sz="1600" dirty="0"/>
+              <a:rPr lang="ja-JP" altLang="en-US" sz="1600" dirty="0">
+                <a:latin typeface="+mn-ea"/>
+              </a:rPr>
               <a:t>でなく、すべてのエンジニアが</a:t>
             </a:r>
             <a:r>
-              <a:rPr lang="ja-JP" altLang="en-US" sz="1600" dirty="0" smtClean="0"/>
+              <a:rPr lang="ja-JP" altLang="en-US" sz="1600" dirty="0" smtClean="0">
+                <a:latin typeface="+mn-ea"/>
+              </a:rPr>
               <a:t>ハッピーになれる</a:t>
             </a:r>
             <a:r>
-              <a:rPr lang="ja-JP" altLang="en-US" sz="1600" dirty="0"/>
+              <a:rPr lang="ja-JP" altLang="en-US" sz="1600" dirty="0">
+                <a:latin typeface="+mn-ea"/>
+              </a:rPr>
               <a:t>未来</a:t>
             </a:r>
             <a:r>
-              <a:rPr lang="ja-JP" altLang="en-US" sz="1600" dirty="0" smtClean="0"/>
-              <a:t>が待っていると信じております。</a:t>
-            </a:r>
-            <a:endParaRPr lang="ja-JP" altLang="en-US" sz="1600" b="1" dirty="0"/>
+              <a:rPr lang="ja-JP" altLang="en-US" sz="1600" dirty="0" smtClean="0">
+                <a:latin typeface="+mn-ea"/>
+              </a:rPr>
+              <a:t>が待って</a:t>
+            </a:r>
+            <a:r>
+              <a:rPr lang="ja-JP" altLang="en-US" sz="1600" dirty="0" smtClean="0">
+                <a:latin typeface="+mn-ea"/>
+              </a:rPr>
+              <a:t>いる</a:t>
+            </a:r>
+            <a:r>
+              <a:rPr lang="ja-JP" altLang="en-US" sz="1600" dirty="0">
+                <a:latin typeface="+mn-ea"/>
+              </a:rPr>
+              <a:t>はず</a:t>
+            </a:r>
+            <a:r>
+              <a:rPr lang="ja-JP" altLang="en-US" sz="1600" dirty="0" smtClean="0">
+                <a:latin typeface="+mn-ea"/>
+              </a:rPr>
+              <a:t>です。</a:t>
+            </a:r>
+            <a:endParaRPr lang="ja-JP" altLang="en-US" sz="1600" b="1" dirty="0">
+              <a:latin typeface="+mn-ea"/>
+            </a:endParaRPr>
           </a:p>
           <a:p>
             <a:pPr marL="481013" indent="-481013" defTabSz="1279525">
@@ -34467,7 +35067,9 @@
                 <a:spcPct val="20000"/>
               </a:spcBef>
             </a:pPr>
-            <a:endParaRPr lang="ja-JP" altLang="en-US" sz="1600" b="1" dirty="0"/>
+            <a:endParaRPr lang="ja-JP" altLang="en-US" sz="1600" b="1" dirty="0">
+              <a:latin typeface="+mn-ea"/>
+            </a:endParaRPr>
           </a:p>
           <a:p>
             <a:pPr marL="481013" indent="-481013" defTabSz="1279525">
@@ -34479,14 +35081,20 @@
               </a:spcBef>
             </a:pPr>
             <a:r>
-              <a:rPr lang="ja-JP" altLang="en-US" sz="1800" b="1" dirty="0"/>
+              <a:rPr lang="ja-JP" altLang="en-US" sz="1800" b="1" dirty="0">
+                <a:latin typeface="+mn-ea"/>
+              </a:rPr>
               <a:t>☆コンテストにかける</a:t>
             </a:r>
             <a:r>
-              <a:rPr lang="ja-JP" altLang="en-US" sz="1800" b="1" dirty="0" smtClean="0"/>
+              <a:rPr lang="ja-JP" altLang="en-US" sz="1800" b="1" dirty="0" smtClean="0">
+                <a:latin typeface="+mn-ea"/>
+              </a:rPr>
               <a:t>意気込み，アピール</a:t>
             </a:r>
-            <a:endParaRPr lang="en-US" altLang="ja-JP" sz="1800" b="1" dirty="0" smtClean="0"/>
+            <a:endParaRPr lang="en-US" altLang="ja-JP" sz="1800" b="1" dirty="0" smtClean="0">
+              <a:latin typeface="+mn-ea"/>
+            </a:endParaRPr>
           </a:p>
           <a:p>
             <a:pPr marL="481013" indent="-481013" defTabSz="1279525">
@@ -34497,7 +35105,9 @@
                 <a:spcPct val="20000"/>
               </a:spcBef>
             </a:pPr>
-            <a:endParaRPr lang="ja-JP" altLang="en-US" sz="1800" b="1" dirty="0"/>
+            <a:endParaRPr lang="ja-JP" altLang="en-US" sz="1800" b="1" dirty="0">
+              <a:latin typeface="+mn-ea"/>
+            </a:endParaRPr>
           </a:p>
           <a:p>
             <a:pPr marL="481013" indent="-481013" defTabSz="1279525">
@@ -34509,117 +35119,114 @@
               </a:spcBef>
             </a:pPr>
             <a:r>
-              <a:rPr lang="en-US" altLang="ja-JP" sz="1800" dirty="0"/>
+              <a:rPr lang="en-US" altLang="ja-JP" sz="1800" dirty="0">
+                <a:latin typeface="+mn-ea"/>
+              </a:rPr>
               <a:t>	</a:t>
             </a:r>
             <a:r>
-              <a:rPr lang="ja-JP" altLang="en-US" sz="1800" dirty="0" smtClean="0"/>
+              <a:rPr lang="ja-JP" altLang="en-US" sz="1800" dirty="0" smtClean="0">
+                <a:latin typeface="+mn-ea"/>
+              </a:rPr>
               <a:t>　</a:t>
             </a:r>
             <a:r>
               <a:rPr lang="ja-JP" altLang="en-US" sz="1600" dirty="0" smtClean="0">
-                <a:latin typeface="+mj-ea"/>
-                <a:ea typeface="+mj-ea"/>
+                <a:latin typeface="+mn-ea"/>
               </a:rPr>
               <a:t>昨年</a:t>
             </a:r>
             <a:r>
               <a:rPr lang="ja-JP" altLang="en-US" sz="1600" dirty="0">
-                <a:latin typeface="+mj-ea"/>
-                <a:ea typeface="+mj-ea"/>
+                <a:latin typeface="+mn-ea"/>
               </a:rPr>
               <a:t>果たせなかった悲願の全国大会出場</a:t>
             </a:r>
             <a:r>
               <a:rPr lang="ja-JP" altLang="en-US" sz="1600" dirty="0" smtClean="0">
-                <a:latin typeface="+mj-ea"/>
-                <a:ea typeface="+mj-ea"/>
+                <a:latin typeface="+mn-ea"/>
               </a:rPr>
               <a:t>を</a:t>
             </a:r>
             <a:r>
               <a:rPr lang="en-US" altLang="ja-JP" sz="1600" dirty="0" smtClean="0">
-                <a:latin typeface="+mj-ea"/>
-                <a:ea typeface="+mj-ea"/>
+                <a:latin typeface="+mn-ea"/>
               </a:rPr>
               <a:t/>
             </a:r>
             <a:br>
               <a:rPr lang="en-US" altLang="ja-JP" sz="1600" dirty="0" smtClean="0">
-                <a:latin typeface="+mj-ea"/>
-                <a:ea typeface="+mj-ea"/>
+                <a:latin typeface="+mn-ea"/>
               </a:rPr>
             </a:br>
             <a:r>
               <a:rPr lang="ja-JP" altLang="en-US" sz="1600" dirty="0">
-                <a:latin typeface="+mj-ea"/>
-                <a:ea typeface="+mj-ea"/>
+                <a:latin typeface="+mn-ea"/>
               </a:rPr>
               <a:t>果たします</a:t>
             </a:r>
             <a:r>
               <a:rPr lang="ja-JP" altLang="en-US" sz="1600" dirty="0" smtClean="0">
-                <a:latin typeface="+mj-ea"/>
-                <a:ea typeface="+mj-ea"/>
+                <a:latin typeface="+mn-ea"/>
               </a:rPr>
               <a:t>！！</a:t>
             </a:r>
             <a:r>
               <a:rPr lang="en-US" altLang="ja-JP" sz="1600" dirty="0" smtClean="0">
-                <a:latin typeface="+mj-ea"/>
-                <a:ea typeface="+mj-ea"/>
+                <a:latin typeface="+mn-ea"/>
               </a:rPr>
               <a:t/>
             </a:r>
             <a:br>
               <a:rPr lang="en-US" altLang="ja-JP" sz="1600" dirty="0" smtClean="0">
-                <a:latin typeface="+mj-ea"/>
-                <a:ea typeface="+mj-ea"/>
+                <a:latin typeface="+mn-ea"/>
               </a:rPr>
             </a:br>
             <a:r>
               <a:rPr lang="ja-JP" altLang="en-US" sz="1600" dirty="0" smtClean="0">
-                <a:latin typeface="+mj-ea"/>
-                <a:ea typeface="+mj-ea"/>
-              </a:rPr>
-              <a:t>高専で</a:t>
+                <a:latin typeface="+mn-ea"/>
+              </a:rPr>
+              <a:t>　高専</a:t>
+            </a:r>
+            <a:r>
+              <a:rPr lang="ja-JP" altLang="en-US" sz="1600" dirty="0" smtClean="0">
+                <a:latin typeface="+mn-ea"/>
+              </a:rPr>
+              <a:t>で</a:t>
             </a:r>
             <a:r>
               <a:rPr lang="en-US" altLang="ja-JP" sz="1600" dirty="0" smtClean="0">
-                <a:latin typeface="+mj-ea"/>
-                <a:ea typeface="+mj-ea"/>
+                <a:latin typeface="+mn-ea"/>
               </a:rPr>
               <a:t>15</a:t>
             </a:r>
             <a:r>
               <a:rPr lang="ja-JP" altLang="en-US" sz="1600" dirty="0" smtClean="0">
-                <a:latin typeface="+mj-ea"/>
-                <a:ea typeface="+mj-ea"/>
+                <a:latin typeface="+mn-ea"/>
               </a:rPr>
               <a:t>歳から受けた教育をベースにした高専生</a:t>
             </a:r>
             <a:r>
               <a:rPr lang="ja-JP" altLang="en-US" sz="1600" dirty="0">
-                <a:latin typeface="+mj-ea"/>
-                <a:ea typeface="+mj-ea"/>
+                <a:latin typeface="+mn-ea"/>
               </a:rPr>
               <a:t>の実力</a:t>
             </a:r>
             <a:r>
               <a:rPr lang="ja-JP" altLang="en-US" sz="1600" dirty="0" smtClean="0">
-                <a:latin typeface="+mj-ea"/>
-                <a:ea typeface="+mj-ea"/>
+                <a:latin typeface="+mn-ea"/>
               </a:rPr>
               <a:t>をお見せします</a:t>
             </a:r>
             <a:r>
               <a:rPr lang="ja-JP" altLang="en-US" sz="1600" dirty="0">
-                <a:latin typeface="+mj-ea"/>
-                <a:ea typeface="+mj-ea"/>
+                <a:latin typeface="+mn-ea"/>
               </a:rPr>
               <a:t>！</a:t>
             </a:r>
-            <a:endParaRPr lang="en-US" altLang="ja-JP" sz="1900" dirty="0"/>
+            <a:endParaRPr lang="en-US" altLang="ja-JP" sz="1900" dirty="0">
+              <a:latin typeface="+mn-ea"/>
+            </a:endParaRPr>
           </a:p>
         </p:txBody>
       </p:sp>
@@ -34706,7 +35313,7 @@
         </p:blipFill>
         <p:spPr bwMode="auto">
           <a:xfrm>
-            <a:off x="10752559" y="3000400"/>
+            <a:off x="11065149" y="2904024"/>
             <a:ext cx="1851347" cy="1177502"/>
           </a:xfrm>
           <a:prstGeom prst="rect">
@@ -42891,7 +43498,7 @@
           <p:nvPr>
             <p:extLst>
               <p:ext uri="{D42A27DB-BD31-4B8C-83A1-F6EECF244321}">
-                <p14:modId xmlns:p14="http://schemas.microsoft.com/office/powerpoint/2010/main" val="2493521598"/>
+                <p14:modId xmlns:p14="http://schemas.microsoft.com/office/powerpoint/2010/main" val="2665334506"/>
               </p:ext>
             </p:extLst>
           </p:nvPr>
@@ -43059,15 +43666,23 @@
                       <a:pPr algn="l"/>
                       <a:r>
                         <a:rPr kumimoji="1" lang="ja-JP" altLang="en-US" sz="900" dirty="0" smtClean="0"/>
-                        <a:t>制約条件より，バランサーとそれに関連する</a:t>
-                      </a:r>
-                      <a:r>
-                        <a:rPr kumimoji="1" lang="en-US" altLang="ja-JP" sz="900" dirty="0" err="1" smtClean="0"/>
-                        <a:t>ku</a:t>
+                        <a:t>制約条件より，</a:t>
                       </a:r>
                       <a:r>
                         <a:rPr kumimoji="1" lang="ja-JP" altLang="en-US" sz="900" dirty="0" smtClean="0"/>
-                        <a:t>処理は</a:t>
+                        <a:t>バランサーと</a:t>
+                      </a:r>
+                      <a:r>
+                        <a:rPr kumimoji="1" lang="ja-JP" altLang="en-US" sz="900" dirty="0" smtClean="0"/>
+                        <a:t>それに関連</a:t>
+                      </a:r>
+                      <a:r>
+                        <a:rPr kumimoji="1" lang="ja-JP" altLang="en-US" sz="900" dirty="0" smtClean="0"/>
+                        <a:t>する処理</a:t>
+                      </a:r>
+                      <a:r>
+                        <a:rPr kumimoji="1" lang="ja-JP" altLang="en-US" sz="900" dirty="0" smtClean="0"/>
+                        <a:t>は</a:t>
                       </a:r>
                       <a:r>
                         <a:rPr kumimoji="1" lang="en-US" altLang="ja-JP" sz="900" dirty="0" smtClean="0"/>

</xml_diff>